<commit_message>
Full draft life cycle notes
</commit_message>
<xml_diff>
--- a/images/graphics.pptx
+++ b/images/graphics.pptx
@@ -7,6 +7,7 @@
   <p:sldIdLst>
     <p:sldId id="257" r:id="rId2"/>
     <p:sldId id="258" r:id="rId3"/>
+    <p:sldId id="259" r:id="rId4"/>
   </p:sldIdLst>
   <p:sldSz cx="12192000" cy="6858000"/>
   <p:notesSz cx="6858000" cy="9144000"/>
@@ -5140,6 +5141,588 @@
 </p:sld>
 </file>
 
+<file path=ppt/slides/slide3.xml><?xml version="1.0" encoding="utf-8"?>
+<p:sld xmlns:a="http://schemas.openxmlformats.org/drawingml/2006/main" xmlns:r="http://schemas.openxmlformats.org/officeDocument/2006/relationships" xmlns:p="http://schemas.openxmlformats.org/presentationml/2006/main">
+  <p:cSld>
+    <p:spTree>
+      <p:nvGrpSpPr>
+        <p:cNvPr id="1" name=""/>
+        <p:cNvGrpSpPr/>
+        <p:nvPr/>
+      </p:nvGrpSpPr>
+      <p:grpSpPr>
+        <a:xfrm>
+          <a:off x="0" y="0"/>
+          <a:ext cx="0" cy="0"/>
+          <a:chOff x="0" y="0"/>
+          <a:chExt cx="0" cy="0"/>
+        </a:xfrm>
+      </p:grpSpPr>
+      <p:sp>
+        <p:nvSpPr>
+          <p:cNvPr id="4" name="Rectangle 3">
+            <a:extLst>
+              <a:ext uri="{FF2B5EF4-FFF2-40B4-BE49-F238E27FC236}">
+                <a16:creationId xmlns:a16="http://schemas.microsoft.com/office/drawing/2014/main" id="{C7ECCC9F-944F-25A4-D5FE-8CD9B183443A}"/>
+              </a:ext>
+            </a:extLst>
+          </p:cNvPr>
+          <p:cNvSpPr/>
+          <p:nvPr/>
+        </p:nvSpPr>
+        <p:spPr>
+          <a:xfrm>
+            <a:off x="3043881" y="1124466"/>
+            <a:ext cx="2496065" cy="2496065"/>
+          </a:xfrm>
+          <a:prstGeom prst="rect">
+            <a:avLst/>
+          </a:prstGeom>
+          <a:solidFill>
+            <a:schemeClr val="accent4">
+              <a:lumMod val="20000"/>
+              <a:lumOff val="80000"/>
+            </a:schemeClr>
+          </a:solidFill>
+          <a:ln>
+            <a:noFill/>
+          </a:ln>
+        </p:spPr>
+        <p:style>
+          <a:lnRef idx="2">
+            <a:schemeClr val="accent1"/>
+          </a:lnRef>
+          <a:fillRef idx="1">
+            <a:schemeClr val="lt1"/>
+          </a:fillRef>
+          <a:effectRef idx="0">
+            <a:schemeClr val="accent1"/>
+          </a:effectRef>
+          <a:fontRef idx="minor">
+            <a:schemeClr val="dk1"/>
+          </a:fontRef>
+        </p:style>
+        <p:txBody>
+          <a:bodyPr rtlCol="0" anchor="ctr"/>
+          <a:lstStyle/>
+          <a:p>
+            <a:pPr algn="ctr"/>
+            <a:r>
+              <a:rPr lang="en-US" sz="3200" dirty="0"/>
+              <a:t>Keep </a:t>
+            </a:r>
+          </a:p>
+          <a:p>
+            <a:pPr algn="ctr"/>
+            <a:r>
+              <a:rPr lang="en-US" sz="3200" dirty="0"/>
+              <a:t>satisfied</a:t>
+            </a:r>
+          </a:p>
+        </p:txBody>
+      </p:sp>
+      <p:sp>
+        <p:nvSpPr>
+          <p:cNvPr id="5" name="Rectangle 4">
+            <a:extLst>
+              <a:ext uri="{FF2B5EF4-FFF2-40B4-BE49-F238E27FC236}">
+                <a16:creationId xmlns:a16="http://schemas.microsoft.com/office/drawing/2014/main" id="{E42CA6C5-FA3E-FF9F-2144-857E6D9779DF}"/>
+              </a:ext>
+            </a:extLst>
+          </p:cNvPr>
+          <p:cNvSpPr/>
+          <p:nvPr/>
+        </p:nvSpPr>
+        <p:spPr>
+          <a:xfrm>
+            <a:off x="5539946" y="1124465"/>
+            <a:ext cx="2496065" cy="2496065"/>
+          </a:xfrm>
+          <a:prstGeom prst="rect">
+            <a:avLst/>
+          </a:prstGeom>
+          <a:solidFill>
+            <a:schemeClr val="accent2">
+              <a:lumMod val="20000"/>
+              <a:lumOff val="80000"/>
+            </a:schemeClr>
+          </a:solidFill>
+          <a:ln>
+            <a:noFill/>
+          </a:ln>
+        </p:spPr>
+        <p:style>
+          <a:lnRef idx="2">
+            <a:schemeClr val="accent1"/>
+          </a:lnRef>
+          <a:fillRef idx="1">
+            <a:schemeClr val="lt1"/>
+          </a:fillRef>
+          <a:effectRef idx="0">
+            <a:schemeClr val="accent1"/>
+          </a:effectRef>
+          <a:fontRef idx="minor">
+            <a:schemeClr val="dk1"/>
+          </a:fontRef>
+        </p:style>
+        <p:txBody>
+          <a:bodyPr rtlCol="0" anchor="ctr"/>
+          <a:lstStyle/>
+          <a:p>
+            <a:pPr algn="ctr"/>
+            <a:r>
+              <a:rPr lang="en-US" sz="3200" dirty="0"/>
+              <a:t>Manage closely</a:t>
+            </a:r>
+          </a:p>
+        </p:txBody>
+      </p:sp>
+      <p:sp>
+        <p:nvSpPr>
+          <p:cNvPr id="6" name="Rectangle 5">
+            <a:extLst>
+              <a:ext uri="{FF2B5EF4-FFF2-40B4-BE49-F238E27FC236}">
+                <a16:creationId xmlns:a16="http://schemas.microsoft.com/office/drawing/2014/main" id="{7570EEE8-6DBF-0731-A59C-4C3E2995D4C3}"/>
+              </a:ext>
+            </a:extLst>
+          </p:cNvPr>
+          <p:cNvSpPr/>
+          <p:nvPr/>
+        </p:nvSpPr>
+        <p:spPr>
+          <a:xfrm>
+            <a:off x="3043881" y="3620531"/>
+            <a:ext cx="2496065" cy="2496065"/>
+          </a:xfrm>
+          <a:prstGeom prst="rect">
+            <a:avLst/>
+          </a:prstGeom>
+          <a:solidFill>
+            <a:schemeClr val="accent6">
+              <a:lumMod val="20000"/>
+              <a:lumOff val="80000"/>
+            </a:schemeClr>
+          </a:solidFill>
+          <a:ln>
+            <a:noFill/>
+          </a:ln>
+        </p:spPr>
+        <p:style>
+          <a:lnRef idx="2">
+            <a:schemeClr val="accent1"/>
+          </a:lnRef>
+          <a:fillRef idx="1">
+            <a:schemeClr val="lt1"/>
+          </a:fillRef>
+          <a:effectRef idx="0">
+            <a:schemeClr val="accent1"/>
+          </a:effectRef>
+          <a:fontRef idx="minor">
+            <a:schemeClr val="dk1"/>
+          </a:fontRef>
+        </p:style>
+        <p:txBody>
+          <a:bodyPr rtlCol="0" anchor="ctr"/>
+          <a:lstStyle/>
+          <a:p>
+            <a:pPr algn="ctr"/>
+            <a:r>
+              <a:rPr lang="en-US" sz="3200" dirty="0"/>
+              <a:t>Monitor</a:t>
+            </a:r>
+          </a:p>
+        </p:txBody>
+      </p:sp>
+      <p:sp>
+        <p:nvSpPr>
+          <p:cNvPr id="7" name="Rectangle 6">
+            <a:extLst>
+              <a:ext uri="{FF2B5EF4-FFF2-40B4-BE49-F238E27FC236}">
+                <a16:creationId xmlns:a16="http://schemas.microsoft.com/office/drawing/2014/main" id="{A9B4565E-59C8-B54F-298F-1CEE4E0C6DB5}"/>
+              </a:ext>
+            </a:extLst>
+          </p:cNvPr>
+          <p:cNvSpPr/>
+          <p:nvPr/>
+        </p:nvSpPr>
+        <p:spPr>
+          <a:xfrm>
+            <a:off x="5539946" y="3620530"/>
+            <a:ext cx="2496065" cy="2496065"/>
+          </a:xfrm>
+          <a:prstGeom prst="rect">
+            <a:avLst/>
+          </a:prstGeom>
+          <a:solidFill>
+            <a:schemeClr val="accent4">
+              <a:lumMod val="20000"/>
+              <a:lumOff val="80000"/>
+            </a:schemeClr>
+          </a:solidFill>
+          <a:ln>
+            <a:noFill/>
+          </a:ln>
+        </p:spPr>
+        <p:style>
+          <a:lnRef idx="2">
+            <a:schemeClr val="accent1"/>
+          </a:lnRef>
+          <a:fillRef idx="1">
+            <a:schemeClr val="lt1"/>
+          </a:fillRef>
+          <a:effectRef idx="0">
+            <a:schemeClr val="accent1"/>
+          </a:effectRef>
+          <a:fontRef idx="minor">
+            <a:schemeClr val="dk1"/>
+          </a:fontRef>
+        </p:style>
+        <p:txBody>
+          <a:bodyPr rtlCol="0" anchor="ctr"/>
+          <a:lstStyle/>
+          <a:p>
+            <a:pPr algn="ctr"/>
+            <a:r>
+              <a:rPr lang="en-US" sz="3200" dirty="0"/>
+              <a:t>Keep informed</a:t>
+            </a:r>
+          </a:p>
+        </p:txBody>
+      </p:sp>
+      <p:cxnSp>
+        <p:nvCxnSpPr>
+          <p:cNvPr id="9" name="Straight Arrow Connector 8">
+            <a:extLst>
+              <a:ext uri="{FF2B5EF4-FFF2-40B4-BE49-F238E27FC236}">
+                <a16:creationId xmlns:a16="http://schemas.microsoft.com/office/drawing/2014/main" id="{1003D252-FB1B-7FFB-5559-2933ABE4C8D0}"/>
+              </a:ext>
+            </a:extLst>
+          </p:cNvPr>
+          <p:cNvCxnSpPr/>
+          <p:nvPr/>
+        </p:nvCxnSpPr>
+        <p:spPr>
+          <a:xfrm flipV="1">
+            <a:off x="3043881" y="815546"/>
+            <a:ext cx="0" cy="5301049"/>
+          </a:xfrm>
+          <a:prstGeom prst="straightConnector1">
+            <a:avLst/>
+          </a:prstGeom>
+          <a:ln w="38100">
+            <a:tailEnd type="triangle"/>
+          </a:ln>
+        </p:spPr>
+        <p:style>
+          <a:lnRef idx="1">
+            <a:schemeClr val="accent1"/>
+          </a:lnRef>
+          <a:fillRef idx="0">
+            <a:schemeClr val="accent1"/>
+          </a:fillRef>
+          <a:effectRef idx="0">
+            <a:schemeClr val="accent1"/>
+          </a:effectRef>
+          <a:fontRef idx="minor">
+            <a:schemeClr val="tx1"/>
+          </a:fontRef>
+        </p:style>
+      </p:cxnSp>
+      <p:cxnSp>
+        <p:nvCxnSpPr>
+          <p:cNvPr id="10" name="Straight Arrow Connector 9">
+            <a:extLst>
+              <a:ext uri="{FF2B5EF4-FFF2-40B4-BE49-F238E27FC236}">
+                <a16:creationId xmlns:a16="http://schemas.microsoft.com/office/drawing/2014/main" id="{599EA0B1-45D8-DC17-4C44-4ADC0870CD0A}"/>
+              </a:ext>
+            </a:extLst>
+          </p:cNvPr>
+          <p:cNvCxnSpPr>
+            <a:cxnSpLocks/>
+          </p:cNvCxnSpPr>
+          <p:nvPr/>
+        </p:nvCxnSpPr>
+        <p:spPr>
+          <a:xfrm>
+            <a:off x="3043881" y="6116595"/>
+            <a:ext cx="5276336" cy="0"/>
+          </a:xfrm>
+          <a:prstGeom prst="straightConnector1">
+            <a:avLst/>
+          </a:prstGeom>
+          <a:ln w="38100">
+            <a:tailEnd type="triangle"/>
+          </a:ln>
+        </p:spPr>
+        <p:style>
+          <a:lnRef idx="1">
+            <a:schemeClr val="accent1"/>
+          </a:lnRef>
+          <a:fillRef idx="0">
+            <a:schemeClr val="accent1"/>
+          </a:fillRef>
+          <a:effectRef idx="0">
+            <a:schemeClr val="accent1"/>
+          </a:effectRef>
+          <a:fontRef idx="minor">
+            <a:schemeClr val="tx1"/>
+          </a:fontRef>
+        </p:style>
+      </p:cxnSp>
+      <p:sp>
+        <p:nvSpPr>
+          <p:cNvPr id="15" name="TextBox 14">
+            <a:extLst>
+              <a:ext uri="{FF2B5EF4-FFF2-40B4-BE49-F238E27FC236}">
+                <a16:creationId xmlns:a16="http://schemas.microsoft.com/office/drawing/2014/main" id="{ACDC4A09-BC6C-B9EF-0227-B45C1354BC0A}"/>
+              </a:ext>
+            </a:extLst>
+          </p:cNvPr>
+          <p:cNvSpPr txBox="1"/>
+          <p:nvPr/>
+        </p:nvSpPr>
+        <p:spPr>
+          <a:xfrm>
+            <a:off x="1363363" y="293468"/>
+            <a:ext cx="1383956" cy="830997"/>
+          </a:xfrm>
+          <a:prstGeom prst="rect">
+            <a:avLst/>
+          </a:prstGeom>
+          <a:noFill/>
+          <a:ln>
+            <a:noFill/>
+          </a:ln>
+        </p:spPr>
+        <p:txBody>
+          <a:bodyPr wrap="square" rtlCol="0">
+            <a:spAutoFit/>
+          </a:bodyPr>
+          <a:lstStyle/>
+          <a:p>
+            <a:pPr algn="ctr"/>
+            <a:r>
+              <a:rPr lang="en-US" sz="2400" dirty="0"/>
+              <a:t>Power / influence</a:t>
+            </a:r>
+          </a:p>
+        </p:txBody>
+      </p:sp>
+      <p:sp>
+        <p:nvSpPr>
+          <p:cNvPr id="16" name="TextBox 15">
+            <a:extLst>
+              <a:ext uri="{FF2B5EF4-FFF2-40B4-BE49-F238E27FC236}">
+                <a16:creationId xmlns:a16="http://schemas.microsoft.com/office/drawing/2014/main" id="{449C04E2-717D-DA21-9B3E-77834A5E84EB}"/>
+              </a:ext>
+            </a:extLst>
+          </p:cNvPr>
+          <p:cNvSpPr txBox="1"/>
+          <p:nvPr/>
+        </p:nvSpPr>
+        <p:spPr>
+          <a:xfrm>
+            <a:off x="7572633" y="5935189"/>
+            <a:ext cx="3150971" cy="830997"/>
+          </a:xfrm>
+          <a:prstGeom prst="rect">
+            <a:avLst/>
+          </a:prstGeom>
+          <a:noFill/>
+          <a:ln>
+            <a:noFill/>
+          </a:ln>
+        </p:spPr>
+        <p:txBody>
+          <a:bodyPr wrap="square" rtlCol="0">
+            <a:spAutoFit/>
+          </a:bodyPr>
+          <a:lstStyle/>
+          <a:p>
+            <a:pPr algn="ctr"/>
+            <a:r>
+              <a:rPr lang="en-US" sz="2400" dirty="0"/>
+              <a:t>Interest / </a:t>
+            </a:r>
+          </a:p>
+          <a:p>
+            <a:pPr algn="ctr"/>
+            <a:r>
+              <a:rPr lang="en-US" sz="2400" dirty="0"/>
+              <a:t>importance</a:t>
+            </a:r>
+          </a:p>
+        </p:txBody>
+      </p:sp>
+      <p:sp>
+        <p:nvSpPr>
+          <p:cNvPr id="17" name="TextBox 16">
+            <a:extLst>
+              <a:ext uri="{FF2B5EF4-FFF2-40B4-BE49-F238E27FC236}">
+                <a16:creationId xmlns:a16="http://schemas.microsoft.com/office/drawing/2014/main" id="{3D7AD4C6-0588-BCF8-3312-F213C2370A7B}"/>
+              </a:ext>
+            </a:extLst>
+          </p:cNvPr>
+          <p:cNvSpPr txBox="1"/>
+          <p:nvPr/>
+        </p:nvSpPr>
+        <p:spPr>
+          <a:xfrm>
+            <a:off x="1719651" y="4547286"/>
+            <a:ext cx="1132702" cy="461665"/>
+          </a:xfrm>
+          <a:prstGeom prst="rect">
+            <a:avLst/>
+          </a:prstGeom>
+          <a:noFill/>
+          <a:ln>
+            <a:noFill/>
+          </a:ln>
+        </p:spPr>
+        <p:txBody>
+          <a:bodyPr wrap="square" rtlCol="0">
+            <a:spAutoFit/>
+          </a:bodyPr>
+          <a:lstStyle/>
+          <a:p>
+            <a:pPr algn="ctr"/>
+            <a:r>
+              <a:rPr lang="en-US" sz="2400" dirty="0"/>
+              <a:t>Low</a:t>
+            </a:r>
+          </a:p>
+        </p:txBody>
+      </p:sp>
+      <p:sp>
+        <p:nvSpPr>
+          <p:cNvPr id="18" name="TextBox 17">
+            <a:extLst>
+              <a:ext uri="{FF2B5EF4-FFF2-40B4-BE49-F238E27FC236}">
+                <a16:creationId xmlns:a16="http://schemas.microsoft.com/office/drawing/2014/main" id="{E27E7454-C4A8-9D83-8997-E63D3C697D86}"/>
+              </a:ext>
+            </a:extLst>
+          </p:cNvPr>
+          <p:cNvSpPr txBox="1"/>
+          <p:nvPr/>
+        </p:nvSpPr>
+        <p:spPr>
+          <a:xfrm>
+            <a:off x="3725562" y="6210558"/>
+            <a:ext cx="1132702" cy="461665"/>
+          </a:xfrm>
+          <a:prstGeom prst="rect">
+            <a:avLst/>
+          </a:prstGeom>
+          <a:noFill/>
+          <a:ln>
+            <a:noFill/>
+          </a:ln>
+        </p:spPr>
+        <p:txBody>
+          <a:bodyPr wrap="square" rtlCol="0">
+            <a:spAutoFit/>
+          </a:bodyPr>
+          <a:lstStyle/>
+          <a:p>
+            <a:pPr algn="ctr"/>
+            <a:r>
+              <a:rPr lang="en-US" sz="2400" dirty="0"/>
+              <a:t>Low</a:t>
+            </a:r>
+          </a:p>
+        </p:txBody>
+      </p:sp>
+      <p:sp>
+        <p:nvSpPr>
+          <p:cNvPr id="19" name="TextBox 18">
+            <a:extLst>
+              <a:ext uri="{FF2B5EF4-FFF2-40B4-BE49-F238E27FC236}">
+                <a16:creationId xmlns:a16="http://schemas.microsoft.com/office/drawing/2014/main" id="{A961055F-EC2C-6B26-6C0D-DC5BF101833B}"/>
+              </a:ext>
+            </a:extLst>
+          </p:cNvPr>
+          <p:cNvSpPr txBox="1"/>
+          <p:nvPr/>
+        </p:nvSpPr>
+        <p:spPr>
+          <a:xfrm>
+            <a:off x="1762898" y="2228334"/>
+            <a:ext cx="1132702" cy="461665"/>
+          </a:xfrm>
+          <a:prstGeom prst="rect">
+            <a:avLst/>
+          </a:prstGeom>
+          <a:noFill/>
+          <a:ln>
+            <a:noFill/>
+          </a:ln>
+        </p:spPr>
+        <p:txBody>
+          <a:bodyPr wrap="square" rtlCol="0">
+            <a:spAutoFit/>
+          </a:bodyPr>
+          <a:lstStyle/>
+          <a:p>
+            <a:pPr algn="ctr"/>
+            <a:r>
+              <a:rPr lang="en-US" sz="2400" dirty="0"/>
+              <a:t>High</a:t>
+            </a:r>
+          </a:p>
+        </p:txBody>
+      </p:sp>
+      <p:sp>
+        <p:nvSpPr>
+          <p:cNvPr id="20" name="TextBox 19">
+            <a:extLst>
+              <a:ext uri="{FF2B5EF4-FFF2-40B4-BE49-F238E27FC236}">
+                <a16:creationId xmlns:a16="http://schemas.microsoft.com/office/drawing/2014/main" id="{CC411101-E844-C57F-4B36-B7E32734823B}"/>
+              </a:ext>
+            </a:extLst>
+          </p:cNvPr>
+          <p:cNvSpPr txBox="1"/>
+          <p:nvPr/>
+        </p:nvSpPr>
+        <p:spPr>
+          <a:xfrm>
+            <a:off x="6201036" y="6210557"/>
+            <a:ext cx="1132702" cy="461665"/>
+          </a:xfrm>
+          <a:prstGeom prst="rect">
+            <a:avLst/>
+          </a:prstGeom>
+          <a:noFill/>
+          <a:ln>
+            <a:noFill/>
+          </a:ln>
+        </p:spPr>
+        <p:txBody>
+          <a:bodyPr wrap="square" rtlCol="0">
+            <a:spAutoFit/>
+          </a:bodyPr>
+          <a:lstStyle/>
+          <a:p>
+            <a:pPr algn="ctr"/>
+            <a:r>
+              <a:rPr lang="en-US" sz="2400" dirty="0"/>
+              <a:t>High</a:t>
+            </a:r>
+          </a:p>
+        </p:txBody>
+      </p:sp>
+    </p:spTree>
+    <p:extLst>
+      <p:ext uri="{BB962C8B-B14F-4D97-AF65-F5344CB8AC3E}">
+        <p14:creationId xmlns:p14="http://schemas.microsoft.com/office/powerpoint/2010/main" val="3360722060"/>
+      </p:ext>
+    </p:extLst>
+  </p:cSld>
+  <p:clrMapOvr>
+    <a:masterClrMapping/>
+  </p:clrMapOvr>
+</p:sld>
+</file>
+
 <file path=ppt/theme/theme1.xml><?xml version="1.0" encoding="utf-8"?>
 <a:theme xmlns:a="http://schemas.openxmlformats.org/drawingml/2006/main" name="Office Theme">
   <a:themeElements>

</xml_diff>